<commit_message>
Update 3. Clusterlösung ohne nback.pptx
</commit_message>
<xml_diff>
--- a/presentations/3. Clusterlösung ohne nback.pptx
+++ b/presentations/3. Clusterlösung ohne nback.pptx
@@ -5,7 +5,7 @@
     <p:sldMasterId id="2147483648" r:id="rId1"/>
   </p:sldMasterIdLst>
   <p:notesMasterIdLst>
-    <p:notesMasterId r:id="rId8"/>
+    <p:notesMasterId r:id="rId9"/>
   </p:notesMasterIdLst>
   <p:sldIdLst>
     <p:sldId id="271" r:id="rId2"/>
@@ -13,7 +13,8 @@
     <p:sldId id="275" r:id="rId4"/>
     <p:sldId id="273" r:id="rId5"/>
     <p:sldId id="276" r:id="rId6"/>
-    <p:sldId id="277" r:id="rId7"/>
+    <p:sldId id="278" r:id="rId7"/>
+    <p:sldId id="277" r:id="rId8"/>
   </p:sldIdLst>
   <p:sldSz cx="12192000" cy="6858000"/>
   <p:notesSz cx="6858000" cy="9144000"/>
@@ -5296,8 +5297,13 @@
           <a:p>
             <a:r>
               <a:rPr lang="de-DE" dirty="0"/>
-              <a:t>Abb1: Kein signifikanter Unterschied</a:t>
-            </a:r>
+              <a:t>Abb1: Kein signifikanter </a:t>
+            </a:r>
+            <a:r>
+              <a:rPr lang="de-DE" dirty="0" smtClean="0"/>
+              <a:t>Unterschied (p=.4006)</a:t>
+            </a:r>
+            <a:endParaRPr lang="de-DE" dirty="0"/>
           </a:p>
           <a:p>
             <a:r>
@@ -6110,6 +6116,100 @@
 </file>
 
 <file path=ppt/slides/slide6.xml><?xml version="1.0" encoding="utf-8"?>
+<p:sld xmlns:a="http://schemas.openxmlformats.org/drawingml/2006/main" xmlns:r="http://schemas.openxmlformats.org/officeDocument/2006/relationships" xmlns:p="http://schemas.openxmlformats.org/presentationml/2006/main">
+  <p:cSld>
+    <p:spTree>
+      <p:nvGrpSpPr>
+        <p:cNvPr id="1" name=""/>
+        <p:cNvGrpSpPr/>
+        <p:nvPr/>
+      </p:nvGrpSpPr>
+      <p:grpSpPr>
+        <a:xfrm>
+          <a:off x="0" y="0"/>
+          <a:ext cx="0" cy="0"/>
+          <a:chOff x="0" y="0"/>
+          <a:chExt cx="0" cy="0"/>
+        </a:xfrm>
+      </p:grpSpPr>
+      <p:sp>
+        <p:nvSpPr>
+          <p:cNvPr id="2" name="Titel 1"/>
+          <p:cNvSpPr>
+            <a:spLocks noGrp="1"/>
+          </p:cNvSpPr>
+          <p:nvPr>
+            <p:ph type="title"/>
+          </p:nvPr>
+        </p:nvSpPr>
+        <p:spPr/>
+        <p:txBody>
+          <a:bodyPr/>
+          <a:lstStyle/>
+          <a:p>
+            <a:r>
+              <a:rPr lang="de-DE" dirty="0" smtClean="0"/>
+              <a:t>Sensitivität &amp; Spezifität</a:t>
+            </a:r>
+            <a:endParaRPr lang="de-DE" dirty="0"/>
+          </a:p>
+        </p:txBody>
+      </p:sp>
+      <p:sp>
+        <p:nvSpPr>
+          <p:cNvPr id="3" name="Inhaltsplatzhalter 2"/>
+          <p:cNvSpPr>
+            <a:spLocks noGrp="1"/>
+          </p:cNvSpPr>
+          <p:nvPr>
+            <p:ph idx="1"/>
+          </p:nvPr>
+        </p:nvSpPr>
+        <p:spPr/>
+        <p:txBody>
+          <a:bodyPr/>
+          <a:lstStyle/>
+          <a:p>
+            <a:r>
+              <a:rPr lang="de-DE" dirty="0" smtClean="0"/>
+              <a:t>Sensitivität: 76,74%</a:t>
+            </a:r>
+          </a:p>
+          <a:p>
+            <a:r>
+              <a:rPr lang="de-DE" dirty="0" smtClean="0"/>
+              <a:t>Spezifität: 70,37%</a:t>
+            </a:r>
+          </a:p>
+          <a:p>
+            <a:endParaRPr lang="de-DE" dirty="0"/>
+          </a:p>
+          <a:p>
+            <a:pPr marL="0" indent="0">
+              <a:buNone/>
+            </a:pPr>
+            <a:r>
+              <a:rPr lang="de-DE" dirty="0" smtClean="0"/>
+              <a:t>-&gt; Wobei das ja voraussetzen würde, dass alle Personen sich „richtig“ eingeschätzt hätten</a:t>
+            </a:r>
+            <a:endParaRPr lang="de-DE" dirty="0"/>
+          </a:p>
+        </p:txBody>
+      </p:sp>
+    </p:spTree>
+    <p:extLst>
+      <p:ext uri="{BB962C8B-B14F-4D97-AF65-F5344CB8AC3E}">
+        <p14:creationId xmlns:p14="http://schemas.microsoft.com/office/powerpoint/2010/main" val="3054488753"/>
+      </p:ext>
+    </p:extLst>
+  </p:cSld>
+  <p:clrMapOvr>
+    <a:masterClrMapping/>
+  </p:clrMapOvr>
+</p:sld>
+</file>
+
+<file path=ppt/slides/slide7.xml><?xml version="1.0" encoding="utf-8"?>
 <p:sld xmlns:a="http://schemas.openxmlformats.org/drawingml/2006/main" xmlns:r="http://schemas.openxmlformats.org/officeDocument/2006/relationships" xmlns:p="http://schemas.openxmlformats.org/presentationml/2006/main">
   <p:cSld>
     <p:spTree>
@@ -6841,21 +6941,17 @@
           <a:p>
             <a:r>
               <a:rPr lang="de-DE" dirty="0" smtClean="0"/>
-              <a:t>-&gt; Muss ich um hier eine Aussage treffen zu </a:t>
-            </a:r>
-            <a:r>
-              <a:rPr lang="de-DE" dirty="0" err="1" smtClean="0"/>
-              <a:t>könnnen</a:t>
+              <a:t>-&gt; Muss ich um hier eine Aussage treffen </a:t>
+            </a:r>
+            <a:r>
+              <a:rPr lang="de-DE" smtClean="0"/>
+              <a:t>zu können </a:t>
             </a:r>
             <a:r>
               <a:rPr lang="de-DE" dirty="0" smtClean="0"/>
-              <a:t> erst die </a:t>
-            </a:r>
-            <a:r>
-              <a:rPr lang="de-DE" smtClean="0"/>
-              <a:t>z-Transformation anwenden? </a:t>
-            </a:r>
-            <a:endParaRPr lang="de-DE"/>
+              <a:t>erst die z-Transformation anwenden? </a:t>
+            </a:r>
+            <a:endParaRPr lang="de-DE" dirty="0"/>
           </a:p>
         </p:txBody>
       </p:sp>

</xml_diff>